<commit_message>
Mudança de plano de fundo do PITCH
</commit_message>
<xml_diff>
--- a/PastaDocumentos/Pitch Projeto.pptx
+++ b/PastaDocumentos/Pitch Projeto.pptx
@@ -104,6 +104,11 @@
       </a:defRPr>
     </a:lvl9pPr>
   </p:defaultTextStyle>
+  <p:extLst>
+    <p:ext uri="{EFAFB233-063F-42B5-8137-9DF3F51BA10A}">
+      <p15:sldGuideLst xmlns:p15="http://schemas.microsoft.com/office/powerpoint/2012/main"/>
+    </p:ext>
+  </p:extLst>
 </p:presentation>
 </file>
 
@@ -2740,9 +2745,39 @@
 <p:sldMaster xmlns:a="http://schemas.openxmlformats.org/drawingml/2006/main" xmlns:r="http://schemas.openxmlformats.org/officeDocument/2006/relationships" xmlns:p="http://schemas.openxmlformats.org/presentationml/2006/main">
   <p:cSld>
     <p:bg>
-      <p:bgRef idx="1001">
-        <a:schemeClr val="bg1"/>
-      </p:bgRef>
+      <p:bgPr>
+        <a:gradFill flip="none" rotWithShape="1">
+          <a:gsLst>
+            <a:gs pos="0">
+              <a:schemeClr val="accent1">
+                <a:lumMod val="5000"/>
+                <a:lumOff val="95000"/>
+              </a:schemeClr>
+            </a:gs>
+            <a:gs pos="74000">
+              <a:schemeClr val="accent1">
+                <a:lumMod val="45000"/>
+                <a:lumOff val="55000"/>
+              </a:schemeClr>
+            </a:gs>
+            <a:gs pos="83000">
+              <a:schemeClr val="accent1">
+                <a:lumMod val="45000"/>
+                <a:lumOff val="55000"/>
+              </a:schemeClr>
+            </a:gs>
+            <a:gs pos="100000">
+              <a:schemeClr val="accent1">
+                <a:lumMod val="30000"/>
+                <a:lumOff val="70000"/>
+              </a:schemeClr>
+            </a:gs>
+          </a:gsLst>
+          <a:lin ang="5400000" scaled="1"/>
+          <a:tileRect/>
+        </a:gradFill>
+        <a:effectLst/>
+      </p:bgPr>
     </p:bg>
     <p:spTree>
       <p:nvGrpSpPr>

</xml_diff>